<commit_message>
corrected the spelling for non functional heading
</commit_message>
<xml_diff>
--- a/SRS SDS/Slides/SRS&SDS.pptx
+++ b/SRS SDS/Slides/SRS&SDS.pptx
@@ -354,10 +354,10 @@
           <a:lstStyle/>
           <a:p>
             <a:fld id="{8B157CC9-4D20-4D5E-925B-5051D2717D3F}" type="datetimeFigureOut">
-              <a:rPr lang="en-PK" smtClean="0"/>
+              <a:rPr lang="aa-ET" smtClean="0"/>
               <a:t>20/02/2023</a:t>
             </a:fld>
-            <a:endParaRPr lang="en-PK"/>
+            <a:endParaRPr lang="aa-ET"/>
           </a:p>
         </p:txBody>
       </p:sp>
@@ -376,7 +376,7 @@
           <a:bodyPr/>
           <a:lstStyle/>
           <a:p>
-            <a:endParaRPr lang="en-PK"/>
+            <a:endParaRPr lang="aa-ET"/>
           </a:p>
         </p:txBody>
       </p:sp>
@@ -396,10 +396,10 @@
           <a:lstStyle/>
           <a:p>
             <a:fld id="{FBA66E0E-69A6-40F4-8F54-C4A64AA2437A}" type="slidenum">
-              <a:rPr lang="en-PK" smtClean="0"/>
+              <a:rPr lang="aa-ET" smtClean="0"/>
               <a:t>‹#›</a:t>
             </a:fld>
-            <a:endParaRPr lang="en-PK"/>
+            <a:endParaRPr lang="aa-ET"/>
           </a:p>
         </p:txBody>
       </p:sp>
@@ -562,10 +562,10 @@
           <a:lstStyle/>
           <a:p>
             <a:fld id="{8B157CC9-4D20-4D5E-925B-5051D2717D3F}" type="datetimeFigureOut">
-              <a:rPr lang="en-PK" smtClean="0"/>
+              <a:rPr lang="aa-ET" smtClean="0"/>
               <a:t>20/02/2023</a:t>
             </a:fld>
-            <a:endParaRPr lang="en-PK"/>
+            <a:endParaRPr lang="aa-ET"/>
           </a:p>
         </p:txBody>
       </p:sp>
@@ -584,7 +584,7 @@
           <a:bodyPr/>
           <a:lstStyle/>
           <a:p>
-            <a:endParaRPr lang="en-PK"/>
+            <a:endParaRPr lang="aa-ET"/>
           </a:p>
         </p:txBody>
       </p:sp>
@@ -604,10 +604,10 @@
           <a:lstStyle/>
           <a:p>
             <a:fld id="{FBA66E0E-69A6-40F4-8F54-C4A64AA2437A}" type="slidenum">
-              <a:rPr lang="en-PK" smtClean="0"/>
+              <a:rPr lang="aa-ET" smtClean="0"/>
               <a:t>‹#›</a:t>
             </a:fld>
-            <a:endParaRPr lang="en-PK"/>
+            <a:endParaRPr lang="aa-ET"/>
           </a:p>
         </p:txBody>
       </p:sp>
@@ -818,10 +818,10 @@
           <a:lstStyle/>
           <a:p>
             <a:fld id="{8B157CC9-4D20-4D5E-925B-5051D2717D3F}" type="datetimeFigureOut">
-              <a:rPr lang="en-PK" smtClean="0"/>
+              <a:rPr lang="aa-ET" smtClean="0"/>
               <a:t>20/02/2023</a:t>
             </a:fld>
-            <a:endParaRPr lang="en-PK"/>
+            <a:endParaRPr lang="aa-ET"/>
           </a:p>
         </p:txBody>
       </p:sp>
@@ -840,7 +840,7 @@
           <a:bodyPr/>
           <a:lstStyle/>
           <a:p>
-            <a:endParaRPr lang="en-PK"/>
+            <a:endParaRPr lang="aa-ET"/>
           </a:p>
         </p:txBody>
       </p:sp>
@@ -860,10 +860,10 @@
           <a:lstStyle/>
           <a:p>
             <a:fld id="{FBA66E0E-69A6-40F4-8F54-C4A64AA2437A}" type="slidenum">
-              <a:rPr lang="en-PK" smtClean="0"/>
+              <a:rPr lang="aa-ET" smtClean="0"/>
               <a:t>‹#›</a:t>
             </a:fld>
-            <a:endParaRPr lang="en-PK"/>
+            <a:endParaRPr lang="aa-ET"/>
           </a:p>
         </p:txBody>
       </p:sp>
@@ -992,10 +992,10 @@
           <a:lstStyle/>
           <a:p>
             <a:fld id="{8B157CC9-4D20-4D5E-925B-5051D2717D3F}" type="datetimeFigureOut">
-              <a:rPr lang="en-PK" smtClean="0"/>
+              <a:rPr lang="aa-ET" smtClean="0"/>
               <a:t>20/02/2023</a:t>
             </a:fld>
-            <a:endParaRPr lang="en-PK"/>
+            <a:endParaRPr lang="aa-ET"/>
           </a:p>
         </p:txBody>
       </p:sp>
@@ -1014,7 +1014,7 @@
           <a:bodyPr/>
           <a:lstStyle/>
           <a:p>
-            <a:endParaRPr lang="en-PK"/>
+            <a:endParaRPr lang="aa-ET"/>
           </a:p>
         </p:txBody>
       </p:sp>
@@ -1034,10 +1034,10 @@
           <a:lstStyle/>
           <a:p>
             <a:fld id="{FBA66E0E-69A6-40F4-8F54-C4A64AA2437A}" type="slidenum">
-              <a:rPr lang="en-PK" smtClean="0"/>
+              <a:rPr lang="aa-ET" smtClean="0"/>
               <a:t>‹#›</a:t>
             </a:fld>
-            <a:endParaRPr lang="en-PK"/>
+            <a:endParaRPr lang="aa-ET"/>
           </a:p>
         </p:txBody>
       </p:sp>
@@ -1335,10 +1335,10 @@
           <a:lstStyle/>
           <a:p>
             <a:fld id="{8B157CC9-4D20-4D5E-925B-5051D2717D3F}" type="datetimeFigureOut">
-              <a:rPr lang="en-PK" smtClean="0"/>
+              <a:rPr lang="aa-ET" smtClean="0"/>
               <a:t>20/02/2023</a:t>
             </a:fld>
-            <a:endParaRPr lang="en-PK"/>
+            <a:endParaRPr lang="aa-ET"/>
           </a:p>
         </p:txBody>
       </p:sp>
@@ -1357,7 +1357,7 @@
           <a:bodyPr/>
           <a:lstStyle/>
           <a:p>
-            <a:endParaRPr lang="en-PK"/>
+            <a:endParaRPr lang="aa-ET"/>
           </a:p>
         </p:txBody>
       </p:sp>
@@ -1377,10 +1377,10 @@
           <a:lstStyle/>
           <a:p>
             <a:fld id="{FBA66E0E-69A6-40F4-8F54-C4A64AA2437A}" type="slidenum">
-              <a:rPr lang="en-PK" smtClean="0"/>
+              <a:rPr lang="aa-ET" smtClean="0"/>
               <a:t>‹#›</a:t>
             </a:fld>
-            <a:endParaRPr lang="en-PK"/>
+            <a:endParaRPr lang="aa-ET"/>
           </a:p>
         </p:txBody>
       </p:sp>
@@ -1610,10 +1610,10 @@
           <a:lstStyle/>
           <a:p>
             <a:fld id="{8B157CC9-4D20-4D5E-925B-5051D2717D3F}" type="datetimeFigureOut">
-              <a:rPr lang="en-PK" smtClean="0"/>
+              <a:rPr lang="aa-ET" smtClean="0"/>
               <a:t>20/02/2023</a:t>
             </a:fld>
-            <a:endParaRPr lang="en-PK"/>
+            <a:endParaRPr lang="aa-ET"/>
           </a:p>
         </p:txBody>
       </p:sp>
@@ -1632,7 +1632,7 @@
           <a:bodyPr/>
           <a:lstStyle/>
           <a:p>
-            <a:endParaRPr lang="en-PK"/>
+            <a:endParaRPr lang="aa-ET"/>
           </a:p>
         </p:txBody>
       </p:sp>
@@ -1652,10 +1652,10 @@
           <a:lstStyle/>
           <a:p>
             <a:fld id="{FBA66E0E-69A6-40F4-8F54-C4A64AA2437A}" type="slidenum">
-              <a:rPr lang="en-PK" smtClean="0"/>
+              <a:rPr lang="aa-ET" smtClean="0"/>
               <a:t>‹#›</a:t>
             </a:fld>
-            <a:endParaRPr lang="en-PK"/>
+            <a:endParaRPr lang="aa-ET"/>
           </a:p>
         </p:txBody>
       </p:sp>
@@ -1989,10 +1989,10 @@
           <a:lstStyle/>
           <a:p>
             <a:fld id="{8B157CC9-4D20-4D5E-925B-5051D2717D3F}" type="datetimeFigureOut">
-              <a:rPr lang="en-PK" smtClean="0"/>
+              <a:rPr lang="aa-ET" smtClean="0"/>
               <a:t>20/02/2023</a:t>
             </a:fld>
-            <a:endParaRPr lang="en-PK"/>
+            <a:endParaRPr lang="aa-ET"/>
           </a:p>
         </p:txBody>
       </p:sp>
@@ -2011,7 +2011,7 @@
           <a:bodyPr/>
           <a:lstStyle/>
           <a:p>
-            <a:endParaRPr lang="en-PK"/>
+            <a:endParaRPr lang="aa-ET"/>
           </a:p>
         </p:txBody>
       </p:sp>
@@ -2031,10 +2031,10 @@
           <a:lstStyle/>
           <a:p>
             <a:fld id="{FBA66E0E-69A6-40F4-8F54-C4A64AA2437A}" type="slidenum">
-              <a:rPr lang="en-PK" smtClean="0"/>
+              <a:rPr lang="aa-ET" smtClean="0"/>
               <a:t>‹#›</a:t>
             </a:fld>
-            <a:endParaRPr lang="en-PK"/>
+            <a:endParaRPr lang="aa-ET"/>
           </a:p>
         </p:txBody>
       </p:sp>
@@ -2107,10 +2107,10 @@
           <a:lstStyle/>
           <a:p>
             <a:fld id="{8B157CC9-4D20-4D5E-925B-5051D2717D3F}" type="datetimeFigureOut">
-              <a:rPr lang="en-PK" smtClean="0"/>
+              <a:rPr lang="aa-ET" smtClean="0"/>
               <a:t>20/02/2023</a:t>
             </a:fld>
-            <a:endParaRPr lang="en-PK"/>
+            <a:endParaRPr lang="aa-ET"/>
           </a:p>
         </p:txBody>
       </p:sp>
@@ -2129,7 +2129,7 @@
           <a:bodyPr/>
           <a:lstStyle/>
           <a:p>
-            <a:endParaRPr lang="en-PK"/>
+            <a:endParaRPr lang="aa-ET"/>
           </a:p>
         </p:txBody>
       </p:sp>
@@ -2149,10 +2149,10 @@
           <a:lstStyle/>
           <a:p>
             <a:fld id="{FBA66E0E-69A6-40F4-8F54-C4A64AA2437A}" type="slidenum">
-              <a:rPr lang="en-PK" smtClean="0"/>
+              <a:rPr lang="aa-ET" smtClean="0"/>
               <a:t>‹#›</a:t>
             </a:fld>
-            <a:endParaRPr lang="en-PK"/>
+            <a:endParaRPr lang="aa-ET"/>
           </a:p>
         </p:txBody>
       </p:sp>
@@ -2278,10 +2278,10 @@
           <a:lstStyle/>
           <a:p>
             <a:fld id="{8B157CC9-4D20-4D5E-925B-5051D2717D3F}" type="datetimeFigureOut">
-              <a:rPr lang="en-PK" smtClean="0"/>
+              <a:rPr lang="aa-ET" smtClean="0"/>
               <a:t>20/02/2023</a:t>
             </a:fld>
-            <a:endParaRPr lang="en-PK"/>
+            <a:endParaRPr lang="aa-ET"/>
           </a:p>
         </p:txBody>
       </p:sp>
@@ -2308,7 +2308,7 @@
             </a:lvl1pPr>
           </a:lstStyle>
           <a:p>
-            <a:endParaRPr lang="en-PK"/>
+            <a:endParaRPr lang="aa-ET"/>
           </a:p>
         </p:txBody>
       </p:sp>
@@ -2328,10 +2328,10 @@
           <a:lstStyle/>
           <a:p>
             <a:fld id="{FBA66E0E-69A6-40F4-8F54-C4A64AA2437A}" type="slidenum">
-              <a:rPr lang="en-PK" smtClean="0"/>
+              <a:rPr lang="aa-ET" smtClean="0"/>
               <a:t>‹#›</a:t>
             </a:fld>
-            <a:endParaRPr lang="en-PK"/>
+            <a:endParaRPr lang="aa-ET"/>
           </a:p>
         </p:txBody>
       </p:sp>
@@ -2632,10 +2632,10 @@
           </a:lstStyle>
           <a:p>
             <a:fld id="{8B157CC9-4D20-4D5E-925B-5051D2717D3F}" type="datetimeFigureOut">
-              <a:rPr lang="en-PK" smtClean="0"/>
+              <a:rPr lang="aa-ET" smtClean="0"/>
               <a:t>20/02/2023</a:t>
             </a:fld>
-            <a:endParaRPr lang="en-PK"/>
+            <a:endParaRPr lang="aa-ET"/>
           </a:p>
         </p:txBody>
       </p:sp>
@@ -2667,7 +2667,7 @@
             </a:lvl1pPr>
           </a:lstStyle>
           <a:p>
-            <a:endParaRPr lang="en-PK"/>
+            <a:endParaRPr lang="aa-ET"/>
           </a:p>
         </p:txBody>
       </p:sp>
@@ -2695,10 +2695,10 @@
           </a:lstStyle>
           <a:p>
             <a:fld id="{FBA66E0E-69A6-40F4-8F54-C4A64AA2437A}" type="slidenum">
-              <a:rPr lang="en-PK" smtClean="0"/>
+              <a:rPr lang="aa-ET" smtClean="0"/>
               <a:t>‹#›</a:t>
             </a:fld>
-            <a:endParaRPr lang="en-PK"/>
+            <a:endParaRPr lang="aa-ET"/>
           </a:p>
         </p:txBody>
       </p:sp>
@@ -3014,10 +3014,10 @@
           <a:lstStyle/>
           <a:p>
             <a:fld id="{8B157CC9-4D20-4D5E-925B-5051D2717D3F}" type="datetimeFigureOut">
-              <a:rPr lang="en-PK" smtClean="0"/>
+              <a:rPr lang="aa-ET" smtClean="0"/>
               <a:t>20/02/2023</a:t>
             </a:fld>
-            <a:endParaRPr lang="en-PK"/>
+            <a:endParaRPr lang="aa-ET"/>
           </a:p>
         </p:txBody>
       </p:sp>
@@ -3036,7 +3036,7 @@
           <a:bodyPr/>
           <a:lstStyle/>
           <a:p>
-            <a:endParaRPr lang="en-PK"/>
+            <a:endParaRPr lang="aa-ET"/>
           </a:p>
         </p:txBody>
       </p:sp>
@@ -3056,10 +3056,10 @@
           <a:lstStyle/>
           <a:p>
             <a:fld id="{FBA66E0E-69A6-40F4-8F54-C4A64AA2437A}" type="slidenum">
-              <a:rPr lang="en-PK" smtClean="0"/>
+              <a:rPr lang="aa-ET" smtClean="0"/>
               <a:t>‹#›</a:t>
             </a:fld>
-            <a:endParaRPr lang="en-PK"/>
+            <a:endParaRPr lang="aa-ET"/>
           </a:p>
         </p:txBody>
       </p:sp>
@@ -3301,10 +3301,10 @@
           </a:lstStyle>
           <a:p>
             <a:fld id="{8B157CC9-4D20-4D5E-925B-5051D2717D3F}" type="datetimeFigureOut">
-              <a:rPr lang="en-PK" smtClean="0"/>
+              <a:rPr lang="aa-ET" smtClean="0"/>
               <a:t>20/02/2023</a:t>
             </a:fld>
-            <a:endParaRPr lang="en-PK"/>
+            <a:endParaRPr lang="aa-ET"/>
           </a:p>
         </p:txBody>
       </p:sp>
@@ -3339,7 +3339,7 @@
             </a:lvl1pPr>
           </a:lstStyle>
           <a:p>
-            <a:endParaRPr lang="en-PK"/>
+            <a:endParaRPr lang="aa-ET"/>
           </a:p>
         </p:txBody>
       </p:sp>
@@ -3375,10 +3375,10 @@
           </a:lstStyle>
           <a:p>
             <a:fld id="{FBA66E0E-69A6-40F4-8F54-C4A64AA2437A}" type="slidenum">
-              <a:rPr lang="en-PK" smtClean="0"/>
+              <a:rPr lang="aa-ET" smtClean="0"/>
               <a:t>‹#›</a:t>
             </a:fld>
-            <a:endParaRPr lang="en-PK"/>
+            <a:endParaRPr lang="aa-ET"/>
           </a:p>
         </p:txBody>
       </p:sp>
@@ -3831,7 +3831,7 @@
           <p:cNvPr id="2" name="Title 1">
             <a:extLst>
               <a:ext uri="{FF2B5EF4-FFF2-40B4-BE49-F238E27FC236}">
-                <a16:creationId xmlns:a16="http://schemas.microsoft.com/office/drawing/2014/main" id="{AEFF8FA3-58F6-420D-81A3-6C0213AABC24}"/>
+                <a16:creationId xmlns:a16="http://schemas.microsoft.com/office/drawing/2014/main" xmlns="" id="{AEFF8FA3-58F6-420D-81A3-6C0213AABC24}"/>
               </a:ext>
             </a:extLst>
           </p:cNvPr>
@@ -3854,6 +3854,12 @@
                 <a:spcPct val="100000"/>
               </a:lnSpc>
             </a:pPr>
+            <a:r>
+              <a:rPr lang="en-US" sz="4000" dirty="0">
+                <a:latin typeface="Calisto MT" panose="02040603050505030304" pitchFamily="18" charset="0"/>
+              </a:rPr>
+              <a:t/>
+            </a:r>
             <a:br>
               <a:rPr lang="en-US" sz="4000" dirty="0">
                 <a:latin typeface="Calisto MT" panose="02040603050505030304" pitchFamily="18" charset="0"/>
@@ -3863,8 +3869,12 @@
               <a:rPr lang="en-US" sz="5400" b="1" dirty="0"/>
               <a:t>3D Brain-TAMP</a:t>
             </a:r>
+            <a:r>
+              <a:rPr lang="aa-ET" dirty="0"/>
+              <a:t/>
+            </a:r>
             <a:br>
-              <a:rPr lang="en-PK" dirty="0"/>
+              <a:rPr lang="aa-ET" dirty="0"/>
             </a:br>
             <a:r>
               <a:rPr lang="en-US" sz="4000" dirty="0">
@@ -3872,12 +3882,18 @@
               </a:rPr>
               <a:t>Development of 3D Brain through Taxonomy, Anatomy, Morphology, and Physiology</a:t>
             </a:r>
+            <a:r>
+              <a:rPr lang="aa-ET" sz="4000" dirty="0">
+                <a:latin typeface="Calisto MT" panose="02040603050505030304" pitchFamily="18" charset="0"/>
+              </a:rPr>
+              <a:t/>
+            </a:r>
             <a:br>
-              <a:rPr lang="en-PK" sz="4000" dirty="0">
+              <a:rPr lang="aa-ET" sz="4000" dirty="0">
                 <a:latin typeface="Calisto MT" panose="02040603050505030304" pitchFamily="18" charset="0"/>
               </a:rPr>
             </a:br>
-            <a:endParaRPr lang="en-PK" sz="4000" dirty="0">
+            <a:endParaRPr lang="aa-ET" sz="4000" dirty="0">
               <a:latin typeface="Calisto MT" panose="02040603050505030304" pitchFamily="18" charset="0"/>
             </a:endParaRPr>
           </a:p>
@@ -3888,7 +3904,7 @@
           <p:cNvPr id="3" name="Subtitle 2">
             <a:extLst>
               <a:ext uri="{FF2B5EF4-FFF2-40B4-BE49-F238E27FC236}">
-                <a16:creationId xmlns:a16="http://schemas.microsoft.com/office/drawing/2014/main" id="{DDB0754A-81FB-4E6A-B932-3AE6140D9E09}"/>
+                <a16:creationId xmlns:a16="http://schemas.microsoft.com/office/drawing/2014/main" xmlns="" id="{DDB0754A-81FB-4E6A-B932-3AE6140D9E09}"/>
               </a:ext>
             </a:extLst>
           </p:cNvPr>
@@ -3904,7 +3920,7 @@
           <a:bodyPr/>
           <a:lstStyle/>
           <a:p>
-            <a:endParaRPr lang="en-PK" dirty="0"/>
+            <a:endParaRPr lang="aa-ET" dirty="0"/>
           </a:p>
         </p:txBody>
       </p:sp>
@@ -3918,18 +3934,25 @@
   <p:clrMapOvr>
     <a:masterClrMapping/>
   </p:clrMapOvr>
-  <mc:AlternateContent xmlns:mc="http://schemas.openxmlformats.org/markup-compatibility/2006">
-    <mc:Choice xmlns:p15="http://schemas.microsoft.com/office/powerpoint/2012/main" Requires="p15">
+  <mc:AlternateContent xmlns:mc="http://schemas.openxmlformats.org/markup-compatibility/2006" xmlns:p15="http://schemas.microsoft.com/office/powerpoint/2012/main">
+    <mc:Choice Requires="p15">
       <p:transition xmlns:p14="http://schemas.microsoft.com/office/powerpoint/2010/main" spd="slow" p14:dur="6000">
         <p15:prstTrans prst="curtains"/>
       </p:transition>
     </mc:Choice>
-    <mc:Fallback>
+    <mc:Fallback xmlns="">
       <p:transition spd="slow">
         <p:fade/>
       </p:transition>
     </mc:Fallback>
   </mc:AlternateContent>
+  <p:timing>
+    <p:tnLst>
+      <p:par>
+        <p:cTn id="1" dur="indefinite" restart="never" nodeType="tmRoot"/>
+      </p:par>
+    </p:tnLst>
+  </p:timing>
 </p:sld>
 </file>
 
@@ -3955,7 +3978,7 @@
           <p:cNvPr id="2" name="Title 1">
             <a:extLst>
               <a:ext uri="{FF2B5EF4-FFF2-40B4-BE49-F238E27FC236}">
-                <a16:creationId xmlns:a16="http://schemas.microsoft.com/office/drawing/2014/main" id="{7EABEEAE-B515-456A-BD0A-B7C769BD1876}"/>
+                <a16:creationId xmlns:a16="http://schemas.microsoft.com/office/drawing/2014/main" xmlns="" id="{7EABEEAE-B515-456A-BD0A-B7C769BD1876}"/>
               </a:ext>
             </a:extLst>
           </p:cNvPr>
@@ -3975,10 +3998,14 @@
               <a:rPr lang="en-GB" b="1" dirty="0"/>
               <a:t>Sequence Diagrams</a:t>
             </a:r>
+            <a:r>
+              <a:rPr lang="aa-ET" b="1" dirty="0"/>
+              <a:t/>
+            </a:r>
             <a:br>
-              <a:rPr lang="en-PK" b="1" dirty="0"/>
+              <a:rPr lang="aa-ET" b="1" dirty="0"/>
             </a:br>
-            <a:endParaRPr lang="en-PK" dirty="0"/>
+            <a:endParaRPr lang="aa-ET" dirty="0"/>
           </a:p>
         </p:txBody>
       </p:sp>
@@ -3987,7 +4014,7 @@
           <p:cNvPr id="3" name="Content Placeholder 2">
             <a:extLst>
               <a:ext uri="{FF2B5EF4-FFF2-40B4-BE49-F238E27FC236}">
-                <a16:creationId xmlns:a16="http://schemas.microsoft.com/office/drawing/2014/main" id="{3A2D38BF-F2CB-40D6-A722-560BF052D942}"/>
+                <a16:creationId xmlns:a16="http://schemas.microsoft.com/office/drawing/2014/main" xmlns="" id="{3A2D38BF-F2CB-40D6-A722-560BF052D942}"/>
               </a:ext>
             </a:extLst>
           </p:cNvPr>
@@ -4011,10 +4038,10 @@
               <a:rPr lang="en-GB" b="1" dirty="0"/>
               <a:t>Login</a:t>
             </a:r>
-            <a:endParaRPr lang="en-PK" b="1" dirty="0"/>
-          </a:p>
-          <a:p>
-            <a:endParaRPr lang="en-PK" dirty="0"/>
+            <a:endParaRPr lang="aa-ET" b="1" dirty="0"/>
+          </a:p>
+          <a:p>
+            <a:endParaRPr lang="aa-ET" dirty="0"/>
           </a:p>
         </p:txBody>
       </p:sp>
@@ -4023,7 +4050,7 @@
           <p:cNvPr id="4" name="Picture 3">
             <a:extLst>
               <a:ext uri="{FF2B5EF4-FFF2-40B4-BE49-F238E27FC236}">
-                <a16:creationId xmlns:a16="http://schemas.microsoft.com/office/drawing/2014/main" id="{69304CE6-0C27-4529-A4D6-C04BB1FAEDA9}"/>
+                <a16:creationId xmlns:a16="http://schemas.microsoft.com/office/drawing/2014/main" xmlns="" id="{69304CE6-0C27-4529-A4D6-C04BB1FAEDA9}"/>
               </a:ext>
             </a:extLst>
           </p:cNvPr>
@@ -4095,7 +4122,7 @@
           <p:cNvPr id="2" name="Title 1">
             <a:extLst>
               <a:ext uri="{FF2B5EF4-FFF2-40B4-BE49-F238E27FC236}">
-                <a16:creationId xmlns:a16="http://schemas.microsoft.com/office/drawing/2014/main" id="{7EABEEAE-B515-456A-BD0A-B7C769BD1876}"/>
+                <a16:creationId xmlns:a16="http://schemas.microsoft.com/office/drawing/2014/main" xmlns="" id="{7EABEEAE-B515-456A-BD0A-B7C769BD1876}"/>
               </a:ext>
             </a:extLst>
           </p:cNvPr>
@@ -4115,10 +4142,14 @@
               <a:rPr lang="en-GB" b="1" dirty="0"/>
               <a:t>Sequence Diagrams</a:t>
             </a:r>
+            <a:r>
+              <a:rPr lang="aa-ET" b="1" dirty="0"/>
+              <a:t/>
+            </a:r>
             <a:br>
-              <a:rPr lang="en-PK" b="1" dirty="0"/>
+              <a:rPr lang="aa-ET" b="1" dirty="0"/>
             </a:br>
-            <a:endParaRPr lang="en-PK" dirty="0"/>
+            <a:endParaRPr lang="aa-ET" dirty="0"/>
           </a:p>
         </p:txBody>
       </p:sp>
@@ -4127,7 +4158,7 @@
           <p:cNvPr id="3" name="Content Placeholder 2">
             <a:extLst>
               <a:ext uri="{FF2B5EF4-FFF2-40B4-BE49-F238E27FC236}">
-                <a16:creationId xmlns:a16="http://schemas.microsoft.com/office/drawing/2014/main" id="{3A2D38BF-F2CB-40D6-A722-560BF052D942}"/>
+                <a16:creationId xmlns:a16="http://schemas.microsoft.com/office/drawing/2014/main" xmlns="" id="{3A2D38BF-F2CB-40D6-A722-560BF052D942}"/>
               </a:ext>
             </a:extLst>
           </p:cNvPr>
@@ -4151,17 +4182,17 @@
               <a:rPr lang="en-GB" b="1" dirty="0"/>
               <a:t>Take Quiz/Assessment</a:t>
             </a:r>
-            <a:endParaRPr lang="en-PK" b="1" dirty="0"/>
+            <a:endParaRPr lang="aa-ET" b="1" dirty="0"/>
           </a:p>
           <a:p>
             <a:pPr>
               <a:buFont typeface="Wingdings" panose="05000000000000000000" pitchFamily="2" charset="2"/>
               <a:buChar char="ü"/>
             </a:pPr>
-            <a:endParaRPr lang="en-PK" b="1" dirty="0"/>
-          </a:p>
-          <a:p>
-            <a:endParaRPr lang="en-PK" dirty="0"/>
+            <a:endParaRPr lang="aa-ET" b="1" dirty="0"/>
+          </a:p>
+          <a:p>
+            <a:endParaRPr lang="aa-ET" dirty="0"/>
           </a:p>
         </p:txBody>
       </p:sp>
@@ -4170,7 +4201,7 @@
           <p:cNvPr id="5" name="Picture 4">
             <a:extLst>
               <a:ext uri="{FF2B5EF4-FFF2-40B4-BE49-F238E27FC236}">
-                <a16:creationId xmlns:a16="http://schemas.microsoft.com/office/drawing/2014/main" id="{4F2BDB6D-A0FC-4A9F-90CE-75C50421E098}"/>
+                <a16:creationId xmlns:a16="http://schemas.microsoft.com/office/drawing/2014/main" xmlns="" id="{4F2BDB6D-A0FC-4A9F-90CE-75C50421E098}"/>
               </a:ext>
             </a:extLst>
           </p:cNvPr>
@@ -4242,7 +4273,7 @@
           <p:cNvPr id="2" name="Title 1">
             <a:extLst>
               <a:ext uri="{FF2B5EF4-FFF2-40B4-BE49-F238E27FC236}">
-                <a16:creationId xmlns:a16="http://schemas.microsoft.com/office/drawing/2014/main" id="{8345AED5-D1B6-4C8A-8869-911ABF57C6CD}"/>
+                <a16:creationId xmlns:a16="http://schemas.microsoft.com/office/drawing/2014/main" xmlns="" id="{8345AED5-D1B6-4C8A-8869-911ABF57C6CD}"/>
               </a:ext>
             </a:extLst>
           </p:cNvPr>
@@ -4264,10 +4295,14 @@
               <a:rPr lang="en-GB" sz="4400" b="1" dirty="0"/>
               <a:t>Architecture Design Diagram</a:t>
             </a:r>
+            <a:r>
+              <a:rPr lang="aa-ET" sz="4400" b="1" dirty="0"/>
+              <a:t/>
+            </a:r>
             <a:br>
-              <a:rPr lang="en-PK" sz="4400" b="1" dirty="0"/>
+              <a:rPr lang="aa-ET" sz="4400" b="1" dirty="0"/>
             </a:br>
-            <a:endParaRPr lang="en-PK" sz="4400" dirty="0"/>
+            <a:endParaRPr lang="aa-ET" sz="4400" dirty="0"/>
           </a:p>
         </p:txBody>
       </p:sp>
@@ -4276,7 +4311,7 @@
           <p:cNvPr id="4" name="Content Placeholder 3">
             <a:extLst>
               <a:ext uri="{FF2B5EF4-FFF2-40B4-BE49-F238E27FC236}">
-                <a16:creationId xmlns:a16="http://schemas.microsoft.com/office/drawing/2014/main" id="{7FDB811A-82D8-45CC-A0E2-067D06417BD7}"/>
+                <a16:creationId xmlns:a16="http://schemas.microsoft.com/office/drawing/2014/main" xmlns="" id="{7FDB811A-82D8-45CC-A0E2-067D06417BD7}"/>
               </a:ext>
             </a:extLst>
           </p:cNvPr>
@@ -4349,13 +4384,13 @@
   <p:clrMapOvr>
     <a:masterClrMapping/>
   </p:clrMapOvr>
-  <mc:AlternateContent xmlns:mc="http://schemas.openxmlformats.org/markup-compatibility/2006">
-    <mc:Choice xmlns:p15="http://schemas.microsoft.com/office/powerpoint/2012/main" Requires="p15">
+  <mc:AlternateContent xmlns:mc="http://schemas.openxmlformats.org/markup-compatibility/2006" xmlns:p15="http://schemas.microsoft.com/office/powerpoint/2012/main">
+    <mc:Choice Requires="p15">
       <p:transition xmlns:p14="http://schemas.microsoft.com/office/powerpoint/2010/main" spd="slow" p14:dur="1250">
         <p15:prstTrans prst="pageCurlDouble"/>
       </p:transition>
     </mc:Choice>
-    <mc:Fallback>
+    <mc:Fallback xmlns="">
       <p:transition spd="slow">
         <p:fade/>
       </p:transition>
@@ -4386,7 +4421,7 @@
           <p:cNvPr id="2" name="Title 1">
             <a:extLst>
               <a:ext uri="{FF2B5EF4-FFF2-40B4-BE49-F238E27FC236}">
-                <a16:creationId xmlns:a16="http://schemas.microsoft.com/office/drawing/2014/main" id="{749DF77C-B2D7-4C3D-926D-AAE4AC47D5AE}"/>
+                <a16:creationId xmlns:a16="http://schemas.microsoft.com/office/drawing/2014/main" xmlns="" id="{749DF77C-B2D7-4C3D-926D-AAE4AC47D5AE}"/>
               </a:ext>
             </a:extLst>
           </p:cNvPr>
@@ -4408,10 +4443,14 @@
               <a:rPr lang="en-GB" sz="4400" b="1" dirty="0"/>
               <a:t>Database Diagram</a:t>
             </a:r>
+            <a:r>
+              <a:rPr lang="aa-ET" sz="4400" b="1" dirty="0"/>
+              <a:t/>
+            </a:r>
             <a:br>
-              <a:rPr lang="en-PK" sz="4400" b="1" dirty="0"/>
+              <a:rPr lang="aa-ET" sz="4400" b="1" dirty="0"/>
             </a:br>
-            <a:endParaRPr lang="en-PK" sz="4400" dirty="0"/>
+            <a:endParaRPr lang="aa-ET" sz="4400" dirty="0"/>
           </a:p>
         </p:txBody>
       </p:sp>
@@ -4420,7 +4459,7 @@
           <p:cNvPr id="4" name="Content Placeholder 3">
             <a:extLst>
               <a:ext uri="{FF2B5EF4-FFF2-40B4-BE49-F238E27FC236}">
-                <a16:creationId xmlns:a16="http://schemas.microsoft.com/office/drawing/2014/main" id="{7F0E20B5-AB98-44F4-999A-36C6E9858C1E}"/>
+                <a16:creationId xmlns:a16="http://schemas.microsoft.com/office/drawing/2014/main" xmlns="" id="{7F0E20B5-AB98-44F4-999A-36C6E9858C1E}"/>
               </a:ext>
             </a:extLst>
           </p:cNvPr>
@@ -4463,13 +4502,13 @@
   <p:clrMapOvr>
     <a:masterClrMapping/>
   </p:clrMapOvr>
-  <mc:AlternateContent xmlns:mc="http://schemas.openxmlformats.org/markup-compatibility/2006">
-    <mc:Choice xmlns:p15="http://schemas.microsoft.com/office/powerpoint/2012/main" Requires="p15">
+  <mc:AlternateContent xmlns:mc="http://schemas.openxmlformats.org/markup-compatibility/2006" xmlns:p15="http://schemas.microsoft.com/office/powerpoint/2012/main">
+    <mc:Choice Requires="p15">
       <p:transition xmlns:p14="http://schemas.microsoft.com/office/powerpoint/2010/main" spd="slow" p14:dur="1250">
         <p15:prstTrans prst="peelOff"/>
       </p:transition>
     </mc:Choice>
-    <mc:Fallback>
+    <mc:Fallback xmlns="">
       <p:transition spd="slow">
         <p:fade/>
       </p:transition>
@@ -4500,7 +4539,7 @@
           <p:cNvPr id="2" name="Title 1">
             <a:extLst>
               <a:ext uri="{FF2B5EF4-FFF2-40B4-BE49-F238E27FC236}">
-                <a16:creationId xmlns:a16="http://schemas.microsoft.com/office/drawing/2014/main" id="{83FB8A1A-FEB4-4ABD-87C1-CF12E5BBD4E0}"/>
+                <a16:creationId xmlns:a16="http://schemas.microsoft.com/office/drawing/2014/main" xmlns="" id="{83FB8A1A-FEB4-4ABD-87C1-CF12E5BBD4E0}"/>
               </a:ext>
             </a:extLst>
           </p:cNvPr>
@@ -4522,10 +4561,14 @@
               <a:rPr lang="en-GB" sz="4400" b="1" dirty="0"/>
               <a:t>Class Diagram</a:t>
             </a:r>
+            <a:r>
+              <a:rPr lang="aa-ET" sz="4400" b="1" dirty="0"/>
+              <a:t/>
+            </a:r>
             <a:br>
-              <a:rPr lang="en-PK" sz="4400" b="1" dirty="0"/>
+              <a:rPr lang="aa-ET" sz="4400" b="1" dirty="0"/>
             </a:br>
-            <a:endParaRPr lang="en-PK" sz="4400" dirty="0"/>
+            <a:endParaRPr lang="aa-ET" sz="4400" dirty="0"/>
           </a:p>
         </p:txBody>
       </p:sp>
@@ -4534,7 +4577,7 @@
           <p:cNvPr id="4" name="Content Placeholder 3">
             <a:extLst>
               <a:ext uri="{FF2B5EF4-FFF2-40B4-BE49-F238E27FC236}">
-                <a16:creationId xmlns:a16="http://schemas.microsoft.com/office/drawing/2014/main" id="{AE8A69A9-D651-4B8F-931D-223B9963C9B0}"/>
+                <a16:creationId xmlns:a16="http://schemas.microsoft.com/office/drawing/2014/main" xmlns="" id="{AE8A69A9-D651-4B8F-931D-223B9963C9B0}"/>
               </a:ext>
             </a:extLst>
           </p:cNvPr>
@@ -4582,13 +4625,13 @@
   <p:clrMapOvr>
     <a:masterClrMapping/>
   </p:clrMapOvr>
-  <mc:AlternateContent xmlns:mc="http://schemas.openxmlformats.org/markup-compatibility/2006">
-    <mc:Choice xmlns:p14="http://schemas.microsoft.com/office/powerpoint/2010/main" Requires="p14">
+  <mc:AlternateContent xmlns:mc="http://schemas.openxmlformats.org/markup-compatibility/2006" xmlns:p14="http://schemas.microsoft.com/office/powerpoint/2010/main">
+    <mc:Choice Requires="p14">
       <p:transition spd="slow" p14:dur="1600">
         <p14:prism isInverted="1"/>
       </p:transition>
     </mc:Choice>
-    <mc:Fallback>
+    <mc:Fallback xmlns="">
       <p:transition spd="slow">
         <p:fade/>
       </p:transition>
@@ -4619,7 +4662,7 @@
           <p:cNvPr id="2" name="Title 1">
             <a:extLst>
               <a:ext uri="{FF2B5EF4-FFF2-40B4-BE49-F238E27FC236}">
-                <a16:creationId xmlns:a16="http://schemas.microsoft.com/office/drawing/2014/main" id="{4BEC8DE7-3AB4-4F8D-A240-C1B3DA7BD349}"/>
+                <a16:creationId xmlns:a16="http://schemas.microsoft.com/office/drawing/2014/main" xmlns="" id="{4BEC8DE7-3AB4-4F8D-A240-C1B3DA7BD349}"/>
               </a:ext>
             </a:extLst>
           </p:cNvPr>
@@ -4641,10 +4684,14 @@
               <a:rPr lang="en-GB" sz="4400" b="1" dirty="0"/>
               <a:t>Interface Design</a:t>
             </a:r>
+            <a:r>
+              <a:rPr lang="aa-ET" sz="4400" b="1" dirty="0"/>
+              <a:t/>
+            </a:r>
             <a:br>
-              <a:rPr lang="en-PK" sz="4400" b="1" dirty="0"/>
+              <a:rPr lang="aa-ET" sz="4400" b="1" dirty="0"/>
             </a:br>
-            <a:endParaRPr lang="en-PK" sz="4400" dirty="0"/>
+            <a:endParaRPr lang="aa-ET" sz="4400" dirty="0"/>
           </a:p>
         </p:txBody>
       </p:sp>
@@ -4653,7 +4700,7 @@
           <p:cNvPr id="8" name="Picture 7" descr="Screenshot_20230219_173309">
             <a:extLst>
               <a:ext uri="{FF2B5EF4-FFF2-40B4-BE49-F238E27FC236}">
-                <a16:creationId xmlns:a16="http://schemas.microsoft.com/office/drawing/2014/main" id="{DFA53D95-20F5-4A55-A772-61C6C205E8EE}"/>
+                <a16:creationId xmlns:a16="http://schemas.microsoft.com/office/drawing/2014/main" xmlns="" id="{DFA53D95-20F5-4A55-A772-61C6C205E8EE}"/>
               </a:ext>
             </a:extLst>
           </p:cNvPr>
@@ -4694,7 +4741,7 @@
           <p:cNvPr id="9" name="Picture 8" descr="Screenshot_20230219_173315">
             <a:extLst>
               <a:ext uri="{FF2B5EF4-FFF2-40B4-BE49-F238E27FC236}">
-                <a16:creationId xmlns:a16="http://schemas.microsoft.com/office/drawing/2014/main" id="{218EC212-6882-4CCE-97BE-BB8D6F5B5555}"/>
+                <a16:creationId xmlns:a16="http://schemas.microsoft.com/office/drawing/2014/main" xmlns="" id="{218EC212-6882-4CCE-97BE-BB8D6F5B5555}"/>
               </a:ext>
             </a:extLst>
           </p:cNvPr>
@@ -4735,7 +4782,7 @@
           <p:cNvPr id="10" name="Picture 9" descr="Screenshot_20230219_173325">
             <a:extLst>
               <a:ext uri="{FF2B5EF4-FFF2-40B4-BE49-F238E27FC236}">
-                <a16:creationId xmlns:a16="http://schemas.microsoft.com/office/drawing/2014/main" id="{84F0AEE6-3D29-42CE-8215-2863B91A5610}"/>
+                <a16:creationId xmlns:a16="http://schemas.microsoft.com/office/drawing/2014/main" xmlns="" id="{84F0AEE6-3D29-42CE-8215-2863B91A5610}"/>
               </a:ext>
             </a:extLst>
           </p:cNvPr>
@@ -4781,13 +4828,13 @@
   <p:clrMapOvr>
     <a:masterClrMapping/>
   </p:clrMapOvr>
-  <mc:AlternateContent xmlns:mc="http://schemas.openxmlformats.org/markup-compatibility/2006">
-    <mc:Choice xmlns:p15="http://schemas.microsoft.com/office/powerpoint/2012/main" Requires="p15">
+  <mc:AlternateContent xmlns:mc="http://schemas.openxmlformats.org/markup-compatibility/2006" xmlns:p15="http://schemas.microsoft.com/office/powerpoint/2012/main">
+    <mc:Choice Requires="p15">
       <p:transition xmlns:p14="http://schemas.microsoft.com/office/powerpoint/2010/main" spd="slow" p14:dur="1250">
         <p15:prstTrans prst="pageCurlDouble"/>
       </p:transition>
     </mc:Choice>
-    <mc:Fallback>
+    <mc:Fallback xmlns="">
       <p:transition spd="slow">
         <p:fade/>
       </p:transition>
@@ -4818,7 +4865,7 @@
           <p:cNvPr id="2" name="Title 1">
             <a:extLst>
               <a:ext uri="{FF2B5EF4-FFF2-40B4-BE49-F238E27FC236}">
-                <a16:creationId xmlns:a16="http://schemas.microsoft.com/office/drawing/2014/main" id="{4BEC8DE7-3AB4-4F8D-A240-C1B3DA7BD349}"/>
+                <a16:creationId xmlns:a16="http://schemas.microsoft.com/office/drawing/2014/main" xmlns="" id="{4BEC8DE7-3AB4-4F8D-A240-C1B3DA7BD349}"/>
               </a:ext>
             </a:extLst>
           </p:cNvPr>
@@ -4840,10 +4887,14 @@
               <a:rPr lang="en-GB" sz="4400" b="1" dirty="0"/>
               <a:t>Interface Design</a:t>
             </a:r>
+            <a:r>
+              <a:rPr lang="aa-ET" sz="4400" b="1" dirty="0"/>
+              <a:t/>
+            </a:r>
             <a:br>
-              <a:rPr lang="en-PK" sz="4400" b="1" dirty="0"/>
+              <a:rPr lang="aa-ET" sz="4400" b="1" dirty="0"/>
             </a:br>
-            <a:endParaRPr lang="en-PK" sz="4400" dirty="0"/>
+            <a:endParaRPr lang="aa-ET" sz="4400" dirty="0"/>
           </a:p>
         </p:txBody>
       </p:sp>
@@ -4852,7 +4903,7 @@
           <p:cNvPr id="9" name="Picture 8" descr="D:\BSCS VIII\FYP 2\Design\5.PNG">
             <a:extLst>
               <a:ext uri="{FF2B5EF4-FFF2-40B4-BE49-F238E27FC236}">
-                <a16:creationId xmlns:a16="http://schemas.microsoft.com/office/drawing/2014/main" id="{96B1AEC7-3E8B-4367-B5A2-E767C4D5A0FF}"/>
+                <a16:creationId xmlns:a16="http://schemas.microsoft.com/office/drawing/2014/main" xmlns="" id="{96B1AEC7-3E8B-4367-B5A2-E767C4D5A0FF}"/>
               </a:ext>
             </a:extLst>
           </p:cNvPr>
@@ -4901,7 +4952,7 @@
           <p:cNvPr id="5" name="Picture 4" descr="Screenshot_20230219_173336">
             <a:extLst>
               <a:ext uri="{FF2B5EF4-FFF2-40B4-BE49-F238E27FC236}">
-                <a16:creationId xmlns:a16="http://schemas.microsoft.com/office/drawing/2014/main" id="{48154CE7-1F49-4AF9-BDAA-09C5A09636D3}"/>
+                <a16:creationId xmlns:a16="http://schemas.microsoft.com/office/drawing/2014/main" xmlns="" id="{48154CE7-1F49-4AF9-BDAA-09C5A09636D3}"/>
               </a:ext>
             </a:extLst>
           </p:cNvPr>
@@ -4947,13 +4998,13 @@
   <p:clrMapOvr>
     <a:masterClrMapping/>
   </p:clrMapOvr>
-  <mc:AlternateContent xmlns:mc="http://schemas.openxmlformats.org/markup-compatibility/2006">
-    <mc:Choice xmlns:p14="http://schemas.microsoft.com/office/powerpoint/2010/main" Requires="p14">
+  <mc:AlternateContent xmlns:mc="http://schemas.openxmlformats.org/markup-compatibility/2006" xmlns:p14="http://schemas.microsoft.com/office/powerpoint/2010/main">
+    <mc:Choice Requires="p14">
       <p:transition spd="slow" p14:dur="900">
         <p14:warp dir="in"/>
       </p:transition>
     </mc:Choice>
-    <mc:Fallback>
+    <mc:Fallback xmlns="">
       <p:transition spd="slow">
         <p:fade/>
       </p:transition>
@@ -4984,7 +5035,7 @@
           <p:cNvPr id="2" name="Title 1">
             <a:extLst>
               <a:ext uri="{FF2B5EF4-FFF2-40B4-BE49-F238E27FC236}">
-                <a16:creationId xmlns:a16="http://schemas.microsoft.com/office/drawing/2014/main" id="{C680E475-0D56-4D7D-BCF4-AD62AADCED12}"/>
+                <a16:creationId xmlns:a16="http://schemas.microsoft.com/office/drawing/2014/main" xmlns="" id="{C680E475-0D56-4D7D-BCF4-AD62AADCED12}"/>
               </a:ext>
             </a:extLst>
           </p:cNvPr>
@@ -5011,10 +5062,14 @@
               <a:rPr lang="en-GB" sz="4400" b="1" dirty="0"/>
               <a:t>Test Cases</a:t>
             </a:r>
+            <a:r>
+              <a:rPr lang="aa-ET" sz="4400" b="1" dirty="0"/>
+              <a:t/>
+            </a:r>
             <a:br>
-              <a:rPr lang="en-PK" sz="4400" b="1" dirty="0"/>
+              <a:rPr lang="aa-ET" sz="4400" b="1" dirty="0"/>
             </a:br>
-            <a:endParaRPr lang="en-PK" sz="4400" dirty="0"/>
+            <a:endParaRPr lang="aa-ET" sz="4400" dirty="0"/>
           </a:p>
         </p:txBody>
       </p:sp>
@@ -5023,7 +5078,7 @@
           <p:cNvPr id="4" name="Content Placeholder 3">
             <a:extLst>
               <a:ext uri="{FF2B5EF4-FFF2-40B4-BE49-F238E27FC236}">
-                <a16:creationId xmlns:a16="http://schemas.microsoft.com/office/drawing/2014/main" id="{2F4DDE49-DD12-41F1-AB07-166F08D1E19C}"/>
+                <a16:creationId xmlns:a16="http://schemas.microsoft.com/office/drawing/2014/main" xmlns="" id="{2F4DDE49-DD12-41F1-AB07-166F08D1E19C}"/>
               </a:ext>
             </a:extLst>
           </p:cNvPr>
@@ -5088,7 +5143,7 @@
           <p:cNvPr id="2" name="Title 1">
             <a:extLst>
               <a:ext uri="{FF2B5EF4-FFF2-40B4-BE49-F238E27FC236}">
-                <a16:creationId xmlns:a16="http://schemas.microsoft.com/office/drawing/2014/main" id="{2BA522E3-3F36-48AE-B413-52C82301A263}"/>
+                <a16:creationId xmlns:a16="http://schemas.microsoft.com/office/drawing/2014/main" xmlns="" id="{2BA522E3-3F36-48AE-B413-52C82301A263}"/>
               </a:ext>
             </a:extLst>
           </p:cNvPr>
@@ -5118,12 +5173,18 @@
               </a:rPr>
               <a:t>Thank you!</a:t>
             </a:r>
+            <a:r>
+              <a:rPr lang="aa-ET" sz="9600" dirty="0">
+                <a:latin typeface="Blackadder ITC" panose="04020505051007020D02" pitchFamily="82" charset="0"/>
+              </a:rPr>
+              <a:t/>
+            </a:r>
             <a:br>
-              <a:rPr lang="en-PK" sz="9600" dirty="0">
+              <a:rPr lang="aa-ET" sz="9600" dirty="0">
                 <a:latin typeface="Blackadder ITC" panose="04020505051007020D02" pitchFamily="82" charset="0"/>
               </a:rPr>
             </a:br>
-            <a:endParaRPr lang="en-PK" sz="9600" dirty="0">
+            <a:endParaRPr lang="aa-ET" sz="9600" dirty="0">
               <a:latin typeface="Blackadder ITC" panose="04020505051007020D02" pitchFamily="82" charset="0"/>
             </a:endParaRPr>
           </a:p>
@@ -5139,13 +5200,13 @@
   <p:clrMapOvr>
     <a:masterClrMapping/>
   </p:clrMapOvr>
-  <mc:AlternateContent xmlns:mc="http://schemas.openxmlformats.org/markup-compatibility/2006">
-    <mc:Choice xmlns:p14="http://schemas.microsoft.com/office/powerpoint/2010/main" Requires="p14">
+  <mc:AlternateContent xmlns:mc="http://schemas.openxmlformats.org/markup-compatibility/2006" xmlns:p14="http://schemas.microsoft.com/office/powerpoint/2010/main">
+    <mc:Choice Requires="p14">
       <p:transition spd="slow" p14:dur="1500">
         <p14:window dir="vert"/>
       </p:transition>
     </mc:Choice>
-    <mc:Fallback>
+    <mc:Fallback xmlns="">
       <p:transition spd="slow">
         <p:fade/>
       </p:transition>
@@ -5176,7 +5237,7 @@
           <p:cNvPr id="2" name="Title 1">
             <a:extLst>
               <a:ext uri="{FF2B5EF4-FFF2-40B4-BE49-F238E27FC236}">
-                <a16:creationId xmlns:a16="http://schemas.microsoft.com/office/drawing/2014/main" id="{E7B216CF-798E-403D-AE78-F3247387D722}"/>
+                <a16:creationId xmlns:a16="http://schemas.microsoft.com/office/drawing/2014/main" xmlns="" id="{E7B216CF-798E-403D-AE78-F3247387D722}"/>
               </a:ext>
             </a:extLst>
           </p:cNvPr>
@@ -5198,7 +5259,7 @@
               </a:rPr>
               <a:t>Our Team</a:t>
             </a:r>
-            <a:endParaRPr lang="en-PK" dirty="0">
+            <a:endParaRPr lang="aa-ET" dirty="0">
               <a:latin typeface="+mn-lt"/>
             </a:endParaRPr>
           </a:p>
@@ -5209,7 +5270,7 @@
           <p:cNvPr id="3" name="Content Placeholder 2">
             <a:extLst>
               <a:ext uri="{FF2B5EF4-FFF2-40B4-BE49-F238E27FC236}">
-                <a16:creationId xmlns:a16="http://schemas.microsoft.com/office/drawing/2014/main" id="{67328C4E-00F5-4FA4-8A1B-4DF9171012C8}"/>
+                <a16:creationId xmlns:a16="http://schemas.microsoft.com/office/drawing/2014/main" xmlns="" id="{67328C4E-00F5-4FA4-8A1B-4DF9171012C8}"/>
               </a:ext>
             </a:extLst>
           </p:cNvPr>
@@ -5405,7 +5466,7 @@
             </a:endParaRPr>
           </a:p>
           <a:p>
-            <a:endParaRPr lang="en-PK" dirty="0">
+            <a:endParaRPr lang="aa-ET" dirty="0">
               <a:latin typeface="Arial Narrow" panose="020B0606020202030204" pitchFamily="34" charset="0"/>
             </a:endParaRPr>
           </a:p>
@@ -5421,18 +5482,25 @@
   <p:clrMapOvr>
     <a:masterClrMapping/>
   </p:clrMapOvr>
-  <mc:AlternateContent xmlns:mc="http://schemas.openxmlformats.org/markup-compatibility/2006">
-    <mc:Choice xmlns:p14="http://schemas.microsoft.com/office/powerpoint/2010/main" Requires="p14">
+  <mc:AlternateContent xmlns:mc="http://schemas.openxmlformats.org/markup-compatibility/2006" xmlns:p14="http://schemas.microsoft.com/office/powerpoint/2010/main">
+    <mc:Choice Requires="p14">
       <p:transition spd="slow" p14:dur="1400">
         <p14:doors dir="vert"/>
       </p:transition>
     </mc:Choice>
-    <mc:Fallback>
+    <mc:Fallback xmlns="">
       <p:transition spd="slow">
         <p:fade/>
       </p:transition>
     </mc:Fallback>
   </mc:AlternateContent>
+  <p:timing>
+    <p:tnLst>
+      <p:par>
+        <p:cTn id="1" dur="indefinite" restart="never" nodeType="tmRoot"/>
+      </p:par>
+    </p:tnLst>
+  </p:timing>
 </p:sld>
 </file>
 
@@ -5458,7 +5526,7 @@
           <p:cNvPr id="2" name="Title 1">
             <a:extLst>
               <a:ext uri="{FF2B5EF4-FFF2-40B4-BE49-F238E27FC236}">
-                <a16:creationId xmlns:a16="http://schemas.microsoft.com/office/drawing/2014/main" id="{FC242678-F9CE-4DC2-B535-439C4E4F3E86}"/>
+                <a16:creationId xmlns:a16="http://schemas.microsoft.com/office/drawing/2014/main" xmlns="" id="{FC242678-F9CE-4DC2-B535-439C4E4F3E86}"/>
               </a:ext>
             </a:extLst>
           </p:cNvPr>
@@ -5478,7 +5546,7 @@
               <a:rPr lang="en" b="1" dirty="0"/>
               <a:t>Agenda</a:t>
             </a:r>
-            <a:endParaRPr lang="en-PK" dirty="0"/>
+            <a:endParaRPr lang="aa-ET" dirty="0"/>
           </a:p>
         </p:txBody>
       </p:sp>
@@ -5487,7 +5555,7 @@
           <p:cNvPr id="6" name="Google Shape;292;p15">
             <a:extLst>
               <a:ext uri="{FF2B5EF4-FFF2-40B4-BE49-F238E27FC236}">
-                <a16:creationId xmlns:a16="http://schemas.microsoft.com/office/drawing/2014/main" id="{EA48BFFE-5953-4883-AD60-EA4E3DE397C5}"/>
+                <a16:creationId xmlns:a16="http://schemas.microsoft.com/office/drawing/2014/main" xmlns="" id="{EA48BFFE-5953-4883-AD60-EA4E3DE397C5}"/>
               </a:ext>
             </a:extLst>
           </p:cNvPr>
@@ -5772,8 +5840,12 @@
               <a:buChar char="Ø"/>
             </a:pPr>
             <a:r>
+              <a:rPr lang="en-GB" smtClean="0"/>
+              <a:t>Non Functional </a:t>
+            </a:r>
+            <a:r>
               <a:rPr lang="en-GB" dirty="0"/>
-              <a:t>Functional Requirements</a:t>
+              <a:t>Requirements</a:t>
             </a:r>
           </a:p>
           <a:p>
@@ -5858,18 +5930,25 @@
   <p:clrMapOvr>
     <a:masterClrMapping/>
   </p:clrMapOvr>
-  <mc:AlternateContent xmlns:mc="http://schemas.openxmlformats.org/markup-compatibility/2006">
-    <mc:Choice xmlns:p14="http://schemas.microsoft.com/office/powerpoint/2010/main" Requires="p14">
+  <mc:AlternateContent xmlns:mc="http://schemas.openxmlformats.org/markup-compatibility/2006" xmlns:p14="http://schemas.microsoft.com/office/powerpoint/2010/main">
+    <mc:Choice Requires="p14">
       <p:transition spd="slow" p14:dur="1600">
         <p14:prism isInverted="1"/>
       </p:transition>
     </mc:Choice>
-    <mc:Fallback>
+    <mc:Fallback xmlns="">
       <p:transition spd="slow">
         <p:fade/>
       </p:transition>
     </mc:Fallback>
   </mc:AlternateContent>
+  <p:timing>
+    <p:tnLst>
+      <p:par>
+        <p:cTn id="1" dur="indefinite" restart="never" nodeType="tmRoot"/>
+      </p:par>
+    </p:tnLst>
+  </p:timing>
 </p:sld>
 </file>
 
@@ -5895,7 +5974,7 @@
           <p:cNvPr id="2" name="Title 1">
             <a:extLst>
               <a:ext uri="{FF2B5EF4-FFF2-40B4-BE49-F238E27FC236}">
-                <a16:creationId xmlns:a16="http://schemas.microsoft.com/office/drawing/2014/main" id="{28E297AA-8A60-46E7-B956-D94B430CCAC3}"/>
+                <a16:creationId xmlns:a16="http://schemas.microsoft.com/office/drawing/2014/main" xmlns="" id="{28E297AA-8A60-46E7-B956-D94B430CCAC3}"/>
               </a:ext>
             </a:extLst>
           </p:cNvPr>
@@ -5915,10 +5994,14 @@
               <a:rPr lang="en-GB" b="1" dirty="0"/>
               <a:t>Overall System Description</a:t>
             </a:r>
+            <a:r>
+              <a:rPr lang="aa-ET" b="1" dirty="0"/>
+              <a:t/>
+            </a:r>
             <a:br>
-              <a:rPr lang="en-PK" b="1" dirty="0"/>
+              <a:rPr lang="aa-ET" b="1" dirty="0"/>
             </a:br>
-            <a:endParaRPr lang="en-PK" dirty="0"/>
+            <a:endParaRPr lang="aa-ET" dirty="0"/>
           </a:p>
         </p:txBody>
       </p:sp>
@@ -5927,7 +6010,7 @@
           <p:cNvPr id="3" name="Content Placeholder 2">
             <a:extLst>
               <a:ext uri="{FF2B5EF4-FFF2-40B4-BE49-F238E27FC236}">
-                <a16:creationId xmlns:a16="http://schemas.microsoft.com/office/drawing/2014/main" id="{020BAA52-398C-4AAA-89C6-EA58AE260DAE}"/>
+                <a16:creationId xmlns:a16="http://schemas.microsoft.com/office/drawing/2014/main" xmlns="" id="{020BAA52-398C-4AAA-89C6-EA58AE260DAE}"/>
               </a:ext>
             </a:extLst>
           </p:cNvPr>
@@ -5948,7 +6031,7 @@
               <a:rPr lang="en-GB" b="1" dirty="0"/>
               <a:t>Project Background</a:t>
             </a:r>
-            <a:endParaRPr lang="en-PK" b="1" dirty="0"/>
+            <a:endParaRPr lang="aa-ET" b="1" dirty="0"/>
           </a:p>
           <a:p>
             <a:pPr lvl="1" algn="just"/>
@@ -5963,7 +6046,7 @@
               <a:rPr lang="en-US" b="1" dirty="0"/>
               <a:t>Project Objectives</a:t>
             </a:r>
-            <a:endParaRPr lang="en-PK" b="1" dirty="0"/>
+            <a:endParaRPr lang="aa-ET" b="1" dirty="0"/>
           </a:p>
           <a:p>
             <a:pPr lvl="1" algn="just"/>
@@ -5971,7 +6054,7 @@
               <a:rPr lang="en-GB" dirty="0"/>
               <a:t>To design and develop an interactive User Interface to learn about the human brain using 3D models.</a:t>
             </a:r>
-            <a:endParaRPr lang="en-PK" dirty="0"/>
+            <a:endParaRPr lang="aa-ET" dirty="0"/>
           </a:p>
           <a:p>
             <a:pPr lvl="1" algn="just"/>
@@ -5979,7 +6062,7 @@
               <a:rPr lang="en-GB" dirty="0"/>
               <a:t>To offer to learn to users about the human brain and its different parts of the human brain and how they work.</a:t>
             </a:r>
-            <a:endParaRPr lang="en-PK" dirty="0"/>
+            <a:endParaRPr lang="aa-ET" dirty="0"/>
           </a:p>
           <a:p>
             <a:pPr lvl="1" algn="just"/>
@@ -5987,7 +6070,7 @@
               <a:rPr lang="en-GB" dirty="0"/>
               <a:t>To provide an engaging learning user experience to understand the human brain for students, educators, and even anyone who is of his/hers interest.</a:t>
             </a:r>
-            <a:endParaRPr lang="en-PK" dirty="0"/>
+            <a:endParaRPr lang="aa-ET" dirty="0"/>
           </a:p>
           <a:p>
             <a:pPr lvl="1" algn="just"/>
@@ -6005,18 +6088,25 @@
   <p:clrMapOvr>
     <a:masterClrMapping/>
   </p:clrMapOvr>
-  <mc:AlternateContent xmlns:mc="http://schemas.openxmlformats.org/markup-compatibility/2006">
-    <mc:Choice xmlns:p14="http://schemas.microsoft.com/office/powerpoint/2010/main" Requires="p14">
+  <mc:AlternateContent xmlns:mc="http://schemas.openxmlformats.org/markup-compatibility/2006" xmlns:p14="http://schemas.microsoft.com/office/powerpoint/2010/main">
+    <mc:Choice Requires="p14">
       <p:transition spd="slow" p14:dur="1200">
         <p14:prism/>
       </p:transition>
     </mc:Choice>
-    <mc:Fallback>
+    <mc:Fallback xmlns="">
       <p:transition spd="slow">
         <p:fade/>
       </p:transition>
     </mc:Fallback>
   </mc:AlternateContent>
+  <p:timing>
+    <p:tnLst>
+      <p:par>
+        <p:cTn id="1" dur="indefinite" restart="never" nodeType="tmRoot"/>
+      </p:par>
+    </p:tnLst>
+  </p:timing>
 </p:sld>
 </file>
 
@@ -6042,7 +6132,7 @@
           <p:cNvPr id="2" name="Title 1">
             <a:extLst>
               <a:ext uri="{FF2B5EF4-FFF2-40B4-BE49-F238E27FC236}">
-                <a16:creationId xmlns:a16="http://schemas.microsoft.com/office/drawing/2014/main" id="{1E45A712-A7BA-485A-AC8D-08CFCB0F3A17}"/>
+                <a16:creationId xmlns:a16="http://schemas.microsoft.com/office/drawing/2014/main" xmlns="" id="{1E45A712-A7BA-485A-AC8D-08CFCB0F3A17}"/>
               </a:ext>
             </a:extLst>
           </p:cNvPr>
@@ -6064,10 +6154,14 @@
               <a:rPr lang="en-US" sz="4400" b="1" dirty="0"/>
               <a:t>Functional Requirements</a:t>
             </a:r>
+            <a:r>
+              <a:rPr lang="aa-ET" sz="4400" b="1" dirty="0"/>
+              <a:t/>
+            </a:r>
             <a:br>
-              <a:rPr lang="en-PK" sz="4400" b="1" dirty="0"/>
+              <a:rPr lang="aa-ET" sz="4400" b="1" dirty="0"/>
             </a:br>
-            <a:endParaRPr lang="en-PK" sz="4400" dirty="0"/>
+            <a:endParaRPr lang="aa-ET" sz="4400" dirty="0"/>
           </a:p>
         </p:txBody>
       </p:sp>
@@ -6076,7 +6170,7 @@
           <p:cNvPr id="3" name="Content Placeholder 2">
             <a:extLst>
               <a:ext uri="{FF2B5EF4-FFF2-40B4-BE49-F238E27FC236}">
-                <a16:creationId xmlns:a16="http://schemas.microsoft.com/office/drawing/2014/main" id="{025B9BA9-C5E7-43A8-8E61-C37D33DD4383}"/>
+                <a16:creationId xmlns:a16="http://schemas.microsoft.com/office/drawing/2014/main" xmlns="" id="{025B9BA9-C5E7-43A8-8E61-C37D33DD4383}"/>
               </a:ext>
             </a:extLst>
           </p:cNvPr>
@@ -6112,10 +6206,10 @@
               <a:rPr lang="en-US" sz="2200" dirty="0"/>
               <a:t>The functional hierarchy of the 3D android application for the human brain can be divided into the following modules:</a:t>
             </a:r>
-            <a:endParaRPr lang="en-PK" sz="2200" dirty="0"/>
-          </a:p>
-          <a:p>
-            <a:endParaRPr lang="en-PK" sz="2400" dirty="0"/>
+            <a:endParaRPr lang="aa-ET" sz="2200" dirty="0"/>
+          </a:p>
+          <a:p>
+            <a:endParaRPr lang="aa-ET" sz="2400" dirty="0"/>
           </a:p>
         </p:txBody>
       </p:sp>
@@ -6124,7 +6218,7 @@
           <p:cNvPr id="4" name="Picture 3">
             <a:extLst>
               <a:ext uri="{FF2B5EF4-FFF2-40B4-BE49-F238E27FC236}">
-                <a16:creationId xmlns:a16="http://schemas.microsoft.com/office/drawing/2014/main" id="{A16BD3BF-E1C0-43B2-82C1-16D9B93E387D}"/>
+                <a16:creationId xmlns:a16="http://schemas.microsoft.com/office/drawing/2014/main" xmlns="" id="{A16BD3BF-E1C0-43B2-82C1-16D9B93E387D}"/>
               </a:ext>
             </a:extLst>
           </p:cNvPr>
@@ -6158,13 +6252,13 @@
   <p:clrMapOvr>
     <a:masterClrMapping/>
   </p:clrMapOvr>
-  <mc:AlternateContent xmlns:mc="http://schemas.openxmlformats.org/markup-compatibility/2006">
-    <mc:Choice xmlns:p14="http://schemas.microsoft.com/office/powerpoint/2010/main" Requires="p14">
+  <mc:AlternateContent xmlns:mc="http://schemas.openxmlformats.org/markup-compatibility/2006" xmlns:p14="http://schemas.microsoft.com/office/powerpoint/2010/main">
+    <mc:Choice Requires="p14">
       <p:transition spd="slow" p14:dur="1250">
         <p14:switch dir="r"/>
       </p:transition>
     </mc:Choice>
-    <mc:Fallback>
+    <mc:Fallback xmlns="">
       <p:transition spd="slow">
         <p:fade/>
       </p:transition>
@@ -6195,7 +6289,7 @@
           <p:cNvPr id="2" name="Title 1">
             <a:extLst>
               <a:ext uri="{FF2B5EF4-FFF2-40B4-BE49-F238E27FC236}">
-                <a16:creationId xmlns:a16="http://schemas.microsoft.com/office/drawing/2014/main" id="{82891A8C-8FC4-4C11-8D9D-B122E680773A}"/>
+                <a16:creationId xmlns:a16="http://schemas.microsoft.com/office/drawing/2014/main" xmlns="" id="{82891A8C-8FC4-4C11-8D9D-B122E680773A}"/>
               </a:ext>
             </a:extLst>
           </p:cNvPr>
@@ -6215,10 +6309,14 @@
               <a:rPr lang="en-US" b="1" dirty="0"/>
               <a:t>Use Cases</a:t>
             </a:r>
+            <a:r>
+              <a:rPr lang="aa-ET" b="1" dirty="0"/>
+              <a:t/>
+            </a:r>
             <a:br>
-              <a:rPr lang="en-PK" b="1" dirty="0"/>
+              <a:rPr lang="aa-ET" b="1" dirty="0"/>
             </a:br>
-            <a:endParaRPr lang="en-PK" dirty="0"/>
+            <a:endParaRPr lang="aa-ET" dirty="0"/>
           </a:p>
         </p:txBody>
       </p:sp>
@@ -6227,7 +6325,7 @@
           <p:cNvPr id="6" name="Content Placeholder 5">
             <a:extLst>
               <a:ext uri="{FF2B5EF4-FFF2-40B4-BE49-F238E27FC236}">
-                <a16:creationId xmlns:a16="http://schemas.microsoft.com/office/drawing/2014/main" id="{8FFDAB7C-7AEE-40E3-9EFA-7C252F536BB9}"/>
+                <a16:creationId xmlns:a16="http://schemas.microsoft.com/office/drawing/2014/main" xmlns="" id="{8FFDAB7C-7AEE-40E3-9EFA-7C252F536BB9}"/>
               </a:ext>
             </a:extLst>
           </p:cNvPr>
@@ -6243,7 +6341,7 @@
           <a:bodyPr/>
           <a:lstStyle/>
           <a:p>
-            <a:endParaRPr lang="en-PK" dirty="0"/>
+            <a:endParaRPr lang="aa-ET" dirty="0"/>
           </a:p>
         </p:txBody>
       </p:sp>
@@ -6252,7 +6350,7 @@
           <p:cNvPr id="7" name="Picture 6" descr="Blank diagram">
             <a:extLst>
               <a:ext uri="{FF2B5EF4-FFF2-40B4-BE49-F238E27FC236}">
-                <a16:creationId xmlns:a16="http://schemas.microsoft.com/office/drawing/2014/main" id="{3A9330FC-D370-4174-B344-2504FCB7B35D}"/>
+                <a16:creationId xmlns:a16="http://schemas.microsoft.com/office/drawing/2014/main" xmlns="" id="{3A9330FC-D370-4174-B344-2504FCB7B35D}"/>
               </a:ext>
             </a:extLst>
           </p:cNvPr>
@@ -6285,13 +6383,13 @@
   <p:clrMapOvr>
     <a:masterClrMapping/>
   </p:clrMapOvr>
-  <mc:AlternateContent xmlns:mc="http://schemas.openxmlformats.org/markup-compatibility/2006">
-    <mc:Choice xmlns:p14="http://schemas.microsoft.com/office/powerpoint/2010/main" Requires="p14">
+  <mc:AlternateContent xmlns:mc="http://schemas.openxmlformats.org/markup-compatibility/2006" xmlns:p14="http://schemas.microsoft.com/office/powerpoint/2010/main">
+    <mc:Choice Requires="p14">
       <p:transition spd="slow" p14:dur="1600">
         <p14:prism isContent="1" isInverted="1"/>
       </p:transition>
     </mc:Choice>
-    <mc:Fallback>
+    <mc:Fallback xmlns="">
       <p:transition spd="slow">
         <p:fade/>
       </p:transition>
@@ -6322,7 +6420,7 @@
           <p:cNvPr id="2" name="Title 1">
             <a:extLst>
               <a:ext uri="{FF2B5EF4-FFF2-40B4-BE49-F238E27FC236}">
-                <a16:creationId xmlns:a16="http://schemas.microsoft.com/office/drawing/2014/main" id="{6A16E07B-AFA8-4B03-B959-D76EB46DF035}"/>
+                <a16:creationId xmlns:a16="http://schemas.microsoft.com/office/drawing/2014/main" xmlns="" id="{6A16E07B-AFA8-4B03-B959-D76EB46DF035}"/>
               </a:ext>
             </a:extLst>
           </p:cNvPr>
@@ -6344,10 +6442,14 @@
               <a:rPr lang="en-US" sz="4400" b="1" dirty="0"/>
               <a:t>Non-Functional Requirements</a:t>
             </a:r>
+            <a:r>
+              <a:rPr lang="aa-ET" sz="4400" b="1" dirty="0"/>
+              <a:t/>
+            </a:r>
             <a:br>
-              <a:rPr lang="en-PK" sz="4400" b="1" dirty="0"/>
+              <a:rPr lang="aa-ET" sz="4400" b="1" dirty="0"/>
             </a:br>
-            <a:endParaRPr lang="en-PK" sz="4400" dirty="0"/>
+            <a:endParaRPr lang="aa-ET" sz="4400" dirty="0"/>
           </a:p>
         </p:txBody>
       </p:sp>
@@ -6356,7 +6458,7 @@
           <p:cNvPr id="3" name="Content Placeholder 2">
             <a:extLst>
               <a:ext uri="{FF2B5EF4-FFF2-40B4-BE49-F238E27FC236}">
-                <a16:creationId xmlns:a16="http://schemas.microsoft.com/office/drawing/2014/main" id="{CE5E261E-1C88-4B80-96F5-234FCB257755}"/>
+                <a16:creationId xmlns:a16="http://schemas.microsoft.com/office/drawing/2014/main" xmlns="" id="{CE5E261E-1C88-4B80-96F5-234FCB257755}"/>
               </a:ext>
             </a:extLst>
           </p:cNvPr>
@@ -6390,7 +6492,7 @@
               <a:rPr lang="en-GB" dirty="0"/>
               <a:t>The application should run smoothly on Android devices with minimum system requirements and not have any lag or delay in loading the 3D models and information.</a:t>
             </a:r>
-            <a:endParaRPr lang="en-PK" dirty="0"/>
+            <a:endParaRPr lang="aa-ET" dirty="0"/>
           </a:p>
           <a:p>
             <a:pPr>
@@ -6401,7 +6503,7 @@
               <a:rPr lang="en-US" b="1" dirty="0"/>
               <a:t>Reliability Requirements</a:t>
             </a:r>
-            <a:endParaRPr lang="en-PK" b="1" dirty="0"/>
+            <a:endParaRPr lang="aa-ET" b="1" dirty="0"/>
           </a:p>
           <a:p>
             <a:pPr lvl="1">
@@ -6412,7 +6514,7 @@
               <a:rPr lang="en-GB" dirty="0"/>
               <a:t>The application should be reliable and have minimal downtime. The application should not crash or have any unexpected errors.</a:t>
             </a:r>
-            <a:endParaRPr lang="en-PK" dirty="0"/>
+            <a:endParaRPr lang="aa-ET" dirty="0"/>
           </a:p>
           <a:p>
             <a:pPr>
@@ -6423,7 +6525,7 @@
               <a:rPr lang="en-US" b="1" dirty="0"/>
               <a:t>Security Requirements</a:t>
             </a:r>
-            <a:endParaRPr lang="en-PK" b="1" dirty="0"/>
+            <a:endParaRPr lang="aa-ET" b="1" dirty="0"/>
           </a:p>
           <a:p>
             <a:pPr lvl="1">
@@ -6434,7 +6536,7 @@
               <a:rPr lang="en-GB" dirty="0"/>
               <a:t>The application should be secure from any unauthorized access or data theft. The personal information of the users should be protected and not shared with any third parties.</a:t>
             </a:r>
-            <a:endParaRPr lang="en-PK" dirty="0"/>
+            <a:endParaRPr lang="aa-ET" dirty="0"/>
           </a:p>
           <a:p>
             <a:pPr>
@@ -6445,21 +6547,21 @@
               <a:rPr lang="en-US" b="1" dirty="0"/>
               <a:t>User Documentation</a:t>
             </a:r>
-            <a:endParaRPr lang="en-PK" b="1" dirty="0"/>
+            <a:endParaRPr lang="aa-ET" b="1" dirty="0"/>
           </a:p>
           <a:p>
             <a:pPr>
               <a:buFont typeface="Arial" panose="020B0604020202020204" pitchFamily="34" charset="0"/>
               <a:buChar char="•"/>
             </a:pPr>
-            <a:endParaRPr lang="en-PK" b="1" dirty="0"/>
+            <a:endParaRPr lang="aa-ET" b="1" dirty="0"/>
           </a:p>
           <a:p>
             <a:pPr>
               <a:buFont typeface="Arial" panose="020B0604020202020204" pitchFamily="34" charset="0"/>
               <a:buChar char="•"/>
             </a:pPr>
-            <a:endParaRPr lang="en-PK" dirty="0"/>
+            <a:endParaRPr lang="aa-ET" dirty="0"/>
           </a:p>
         </p:txBody>
       </p:sp>
@@ -6473,13 +6575,13 @@
   <p:clrMapOvr>
     <a:masterClrMapping/>
   </p:clrMapOvr>
-  <mc:AlternateContent xmlns:mc="http://schemas.openxmlformats.org/markup-compatibility/2006">
-    <mc:Choice xmlns:p14="http://schemas.microsoft.com/office/powerpoint/2010/main" Requires="p14">
+  <mc:AlternateContent xmlns:mc="http://schemas.openxmlformats.org/markup-compatibility/2006" xmlns:p14="http://schemas.microsoft.com/office/powerpoint/2010/main">
+    <mc:Choice Requires="p14">
       <p:transition spd="slow" p14:dur="1600">
         <p14:conveyor dir="l"/>
       </p:transition>
     </mc:Choice>
-    <mc:Fallback>
+    <mc:Fallback xmlns="">
       <p:transition spd="slow">
         <p:fade/>
       </p:transition>
@@ -6510,7 +6612,7 @@
           <p:cNvPr id="2" name="Title 1">
             <a:extLst>
               <a:ext uri="{FF2B5EF4-FFF2-40B4-BE49-F238E27FC236}">
-                <a16:creationId xmlns:a16="http://schemas.microsoft.com/office/drawing/2014/main" id="{CEE91865-60C5-4E98-8DAC-1234CD5BE300}"/>
+                <a16:creationId xmlns:a16="http://schemas.microsoft.com/office/drawing/2014/main" xmlns="" id="{CEE91865-60C5-4E98-8DAC-1234CD5BE300}"/>
               </a:ext>
             </a:extLst>
           </p:cNvPr>
@@ -6532,10 +6634,14 @@
               <a:rPr lang="en-GB" sz="4400" b="1" dirty="0"/>
               <a:t>Entity Relationship Diagram (ERD)</a:t>
             </a:r>
+            <a:r>
+              <a:rPr lang="aa-ET" sz="4400" b="1" dirty="0"/>
+              <a:t/>
+            </a:r>
             <a:br>
-              <a:rPr lang="en-PK" sz="4400" b="1" dirty="0"/>
+              <a:rPr lang="aa-ET" sz="4400" b="1" dirty="0"/>
             </a:br>
-            <a:endParaRPr lang="en-PK" sz="4400" dirty="0"/>
+            <a:endParaRPr lang="aa-ET" sz="4400" dirty="0"/>
           </a:p>
         </p:txBody>
       </p:sp>
@@ -6544,7 +6650,7 @@
           <p:cNvPr id="4" name="Content Placeholder 3">
             <a:extLst>
               <a:ext uri="{FF2B5EF4-FFF2-40B4-BE49-F238E27FC236}">
-                <a16:creationId xmlns:a16="http://schemas.microsoft.com/office/drawing/2014/main" id="{C7D8743C-8C7B-456D-A54C-72F1268AE195}"/>
+                <a16:creationId xmlns:a16="http://schemas.microsoft.com/office/drawing/2014/main" xmlns="" id="{C7D8743C-8C7B-456D-A54C-72F1268AE195}"/>
               </a:ext>
             </a:extLst>
           </p:cNvPr>
@@ -6581,13 +6687,13 @@
   <p:clrMapOvr>
     <a:masterClrMapping/>
   </p:clrMapOvr>
-  <mc:AlternateContent xmlns:mc="http://schemas.openxmlformats.org/markup-compatibility/2006">
-    <mc:Choice xmlns:p14="http://schemas.microsoft.com/office/powerpoint/2010/main" Requires="p14">
+  <mc:AlternateContent xmlns:mc="http://schemas.openxmlformats.org/markup-compatibility/2006" xmlns:p14="http://schemas.microsoft.com/office/powerpoint/2010/main">
+    <mc:Choice Requires="p14">
       <p:transition spd="slow" p14:dur="1600">
         <p14:conveyor dir="l"/>
       </p:transition>
     </mc:Choice>
-    <mc:Fallback>
+    <mc:Fallback xmlns="">
       <p:transition spd="slow">
         <p:fade/>
       </p:transition>
@@ -6618,7 +6724,7 @@
           <p:cNvPr id="2" name="Title 1">
             <a:extLst>
               <a:ext uri="{FF2B5EF4-FFF2-40B4-BE49-F238E27FC236}">
-                <a16:creationId xmlns:a16="http://schemas.microsoft.com/office/drawing/2014/main" id="{42939BF8-A34B-470B-9453-4B6E39CDCF77}"/>
+                <a16:creationId xmlns:a16="http://schemas.microsoft.com/office/drawing/2014/main" xmlns="" id="{42939BF8-A34B-470B-9453-4B6E39CDCF77}"/>
               </a:ext>
             </a:extLst>
           </p:cNvPr>
@@ -6640,10 +6746,14 @@
               <a:rPr lang="en-GB" sz="4400" b="1" dirty="0"/>
               <a:t>Sequence Diagrams</a:t>
             </a:r>
+            <a:r>
+              <a:rPr lang="aa-ET" sz="4400" b="1" dirty="0"/>
+              <a:t/>
+            </a:r>
             <a:br>
-              <a:rPr lang="en-PK" sz="4400" b="1" dirty="0"/>
+              <a:rPr lang="aa-ET" sz="4400" b="1" dirty="0"/>
             </a:br>
-            <a:endParaRPr lang="en-PK" sz="4400" dirty="0"/>
+            <a:endParaRPr lang="aa-ET" sz="4400" dirty="0"/>
           </a:p>
         </p:txBody>
       </p:sp>
@@ -6652,7 +6762,7 @@
           <p:cNvPr id="3" name="Content Placeholder 2">
             <a:extLst>
               <a:ext uri="{FF2B5EF4-FFF2-40B4-BE49-F238E27FC236}">
-                <a16:creationId xmlns:a16="http://schemas.microsoft.com/office/drawing/2014/main" id="{78512F34-4B08-4398-A8E4-4BAAC242088A}"/>
+                <a16:creationId xmlns:a16="http://schemas.microsoft.com/office/drawing/2014/main" xmlns="" id="{78512F34-4B08-4398-A8E4-4BAAC242088A}"/>
               </a:ext>
             </a:extLst>
           </p:cNvPr>
@@ -6687,7 +6797,7 @@
           <p:cNvPr id="4" name="Picture 3">
             <a:extLst>
               <a:ext uri="{FF2B5EF4-FFF2-40B4-BE49-F238E27FC236}">
-                <a16:creationId xmlns:a16="http://schemas.microsoft.com/office/drawing/2014/main" id="{21220C29-6966-48FA-B970-11CF9896CBB2}"/>
+                <a16:creationId xmlns:a16="http://schemas.microsoft.com/office/drawing/2014/main" xmlns="" id="{21220C29-6966-48FA-B970-11CF9896CBB2}"/>
               </a:ext>
             </a:extLst>
           </p:cNvPr>
@@ -6731,13 +6841,13 @@
   <p:clrMapOvr>
     <a:masterClrMapping/>
   </p:clrMapOvr>
-  <mc:AlternateContent xmlns:mc="http://schemas.openxmlformats.org/markup-compatibility/2006">
-    <mc:Choice xmlns:p14="http://schemas.microsoft.com/office/powerpoint/2010/main" Requires="p14">
+  <mc:AlternateContent xmlns:mc="http://schemas.openxmlformats.org/markup-compatibility/2006" xmlns:p14="http://schemas.microsoft.com/office/powerpoint/2010/main">
+    <mc:Choice Requires="p14">
       <p:transition spd="slow" p14:dur="1600">
         <p14:gallery dir="l"/>
       </p:transition>
     </mc:Choice>
-    <mc:Fallback>
+    <mc:Fallback xmlns="">
       <p:transition spd="slow">
         <p:fade/>
       </p:transition>

</xml_diff>